<commit_message>
al kindi al farabi ibn sina
</commit_message>
<xml_diff>
--- a/DigSite/New Arcaism/uarm 2024 2/contemporanea/0000 control 1.pptx
+++ b/DigSite/New Arcaism/uarm 2024 2/contemporanea/0000 control 1.pptx
@@ -264,7 +264,7 @@
           <a:p>
             <a:fld id="{B119B8C1-8B2B-446D-B480-128EF97CC988}" type="datetimeFigureOut">
               <a:rPr lang="es-PE" smtClean="0"/>
-              <a:t>23/10/2024</a:t>
+              <a:t>31/10/2024</a:t>
             </a:fld>
             <a:endParaRPr lang="es-PE"/>
           </a:p>
@@ -464,7 +464,7 @@
           <a:p>
             <a:fld id="{B119B8C1-8B2B-446D-B480-128EF97CC988}" type="datetimeFigureOut">
               <a:rPr lang="es-PE" smtClean="0"/>
-              <a:t>23/10/2024</a:t>
+              <a:t>31/10/2024</a:t>
             </a:fld>
             <a:endParaRPr lang="es-PE"/>
           </a:p>
@@ -674,7 +674,7 @@
           <a:p>
             <a:fld id="{B119B8C1-8B2B-446D-B480-128EF97CC988}" type="datetimeFigureOut">
               <a:rPr lang="es-PE" smtClean="0"/>
-              <a:t>23/10/2024</a:t>
+              <a:t>31/10/2024</a:t>
             </a:fld>
             <a:endParaRPr lang="es-PE"/>
           </a:p>
@@ -874,7 +874,7 @@
           <a:p>
             <a:fld id="{B119B8C1-8B2B-446D-B480-128EF97CC988}" type="datetimeFigureOut">
               <a:rPr lang="es-PE" smtClean="0"/>
-              <a:t>23/10/2024</a:t>
+              <a:t>31/10/2024</a:t>
             </a:fld>
             <a:endParaRPr lang="es-PE"/>
           </a:p>
@@ -1150,7 +1150,7 @@
           <a:p>
             <a:fld id="{B119B8C1-8B2B-446D-B480-128EF97CC988}" type="datetimeFigureOut">
               <a:rPr lang="es-PE" smtClean="0"/>
-              <a:t>23/10/2024</a:t>
+              <a:t>31/10/2024</a:t>
             </a:fld>
             <a:endParaRPr lang="es-PE"/>
           </a:p>
@@ -1418,7 +1418,7 @@
           <a:p>
             <a:fld id="{B119B8C1-8B2B-446D-B480-128EF97CC988}" type="datetimeFigureOut">
               <a:rPr lang="es-PE" smtClean="0"/>
-              <a:t>23/10/2024</a:t>
+              <a:t>31/10/2024</a:t>
             </a:fld>
             <a:endParaRPr lang="es-PE"/>
           </a:p>
@@ -1833,7 +1833,7 @@
           <a:p>
             <a:fld id="{B119B8C1-8B2B-446D-B480-128EF97CC988}" type="datetimeFigureOut">
               <a:rPr lang="es-PE" smtClean="0"/>
-              <a:t>23/10/2024</a:t>
+              <a:t>31/10/2024</a:t>
             </a:fld>
             <a:endParaRPr lang="es-PE"/>
           </a:p>
@@ -1975,7 +1975,7 @@
           <a:p>
             <a:fld id="{B119B8C1-8B2B-446D-B480-128EF97CC988}" type="datetimeFigureOut">
               <a:rPr lang="es-PE" smtClean="0"/>
-              <a:t>23/10/2024</a:t>
+              <a:t>31/10/2024</a:t>
             </a:fld>
             <a:endParaRPr lang="es-PE"/>
           </a:p>
@@ -2088,7 +2088,7 @@
           <a:p>
             <a:fld id="{B119B8C1-8B2B-446D-B480-128EF97CC988}" type="datetimeFigureOut">
               <a:rPr lang="es-PE" smtClean="0"/>
-              <a:t>23/10/2024</a:t>
+              <a:t>31/10/2024</a:t>
             </a:fld>
             <a:endParaRPr lang="es-PE"/>
           </a:p>
@@ -2401,7 +2401,7 @@
           <a:p>
             <a:fld id="{B119B8C1-8B2B-446D-B480-128EF97CC988}" type="datetimeFigureOut">
               <a:rPr lang="es-PE" smtClean="0"/>
-              <a:t>23/10/2024</a:t>
+              <a:t>31/10/2024</a:t>
             </a:fld>
             <a:endParaRPr lang="es-PE"/>
           </a:p>
@@ -2690,7 +2690,7 @@
           <a:p>
             <a:fld id="{B119B8C1-8B2B-446D-B480-128EF97CC988}" type="datetimeFigureOut">
               <a:rPr lang="es-PE" smtClean="0"/>
-              <a:t>23/10/2024</a:t>
+              <a:t>31/10/2024</a:t>
             </a:fld>
             <a:endParaRPr lang="es-PE"/>
           </a:p>
@@ -2933,7 +2933,7 @@
           <a:p>
             <a:fld id="{B119B8C1-8B2B-446D-B480-128EF97CC988}" type="datetimeFigureOut">
               <a:rPr lang="es-PE" smtClean="0"/>
-              <a:t>23/10/2024</a:t>
+              <a:t>31/10/2024</a:t>
             </a:fld>
             <a:endParaRPr lang="es-PE"/>
           </a:p>
@@ -3660,15 +3660,7 @@
           <a:p>
             <a:r>
               <a:rPr lang="es-MX" dirty="0"/>
-              <a:t>Fecha límite: Jueves 26 del </a:t>
-            </a:r>
-            <a:r>
-              <a:rPr lang="es-MX" strike="sngStrike" dirty="0"/>
-              <a:t>2027</a:t>
-            </a:r>
-            <a:r>
-              <a:rPr lang="es-MX" dirty="0"/>
-              <a:t> 2024</a:t>
+              <a:t>Fecha límite: CADUCO</a:t>
             </a:r>
             <a:endParaRPr lang="es-PE" dirty="0"/>
           </a:p>
@@ -3810,7 +3802,7 @@
         </p:spPr>
         <p:txBody>
           <a:bodyPr vert="horz" lIns="91440" tIns="45720" rIns="91440" bIns="45720" rtlCol="0">
-            <a:normAutofit lnSpcReduction="10000"/>
+            <a:normAutofit fontScale="92500" lnSpcReduction="10000"/>
           </a:bodyPr>
           <a:lstStyle>
             <a:lvl1pPr marL="0" indent="0" algn="ctr" defTabSz="914400" rtl="0" eaLnBrk="1" latinLnBrk="0" hangingPunct="1">
@@ -4086,8 +4078,27 @@
                 </a:solidFill>
                 <a:effectLst/>
                 <a:latin typeface="Segoe UI" panose="020B0502040204020203" pitchFamily="34" charset="0"/>
+                <a:hlinkClick r:id="rId2"/>
               </a:rPr>
               <a:t>ap2310203@uarm.pe</a:t>
+            </a:r>
+            <a:endParaRPr lang="es-PE" b="0" i="0" dirty="0">
+              <a:solidFill>
+                <a:srgbClr val="0F6CBD"/>
+              </a:solidFill>
+              <a:effectLst/>
+              <a:latin typeface="Segoe UI" panose="020B0502040204020203" pitchFamily="34" charset="0"/>
+            </a:endParaRPr>
+          </a:p>
+          <a:p>
+            <a:r>
+              <a:rPr lang="es-PE" dirty="0">
+                <a:solidFill>
+                  <a:srgbClr val="0F6CBD"/>
+                </a:solidFill>
+                <a:latin typeface="Segoe UI" panose="020B0502040204020203" pitchFamily="34" charset="0"/>
+              </a:rPr>
+              <a:t>Fecha de entrega: hasta este domingo 3 de Nov</a:t>
             </a:r>
             <a:endParaRPr lang="es-PE" dirty="0"/>
           </a:p>
@@ -4229,7 +4240,7 @@
         </p:spPr>
         <p:txBody>
           <a:bodyPr vert="horz" lIns="91440" tIns="45720" rIns="91440" bIns="45720" rtlCol="0">
-            <a:normAutofit fontScale="92500" lnSpcReduction="20000"/>
+            <a:normAutofit fontScale="85000" lnSpcReduction="10000"/>
           </a:bodyPr>
           <a:lstStyle>
             <a:lvl1pPr marL="0" indent="0" algn="ctr" defTabSz="914400" rtl="0" eaLnBrk="1" latinLnBrk="0" hangingPunct="1">
@@ -4505,8 +4516,27 @@
                 </a:solidFill>
                 <a:effectLst/>
                 <a:latin typeface="Segoe UI" panose="020B0502040204020203" pitchFamily="34" charset="0"/>
+                <a:hlinkClick r:id="rId2"/>
               </a:rPr>
               <a:t>ap2310203@uarm.pe</a:t>
+            </a:r>
+            <a:endParaRPr lang="es-PE" b="0" i="0" dirty="0">
+              <a:solidFill>
+                <a:srgbClr val="0F6CBD"/>
+              </a:solidFill>
+              <a:effectLst/>
+              <a:latin typeface="Segoe UI" panose="020B0502040204020203" pitchFamily="34" charset="0"/>
+            </a:endParaRPr>
+          </a:p>
+          <a:p>
+            <a:r>
+              <a:rPr lang="es-PE" dirty="0">
+                <a:solidFill>
+                  <a:srgbClr val="0F6CBD"/>
+                </a:solidFill>
+                <a:latin typeface="Segoe UI" panose="020B0502040204020203" pitchFamily="34" charset="0"/>
+              </a:rPr>
+              <a:t>Fecha: Jueves 7 de Nov</a:t>
             </a:r>
             <a:endParaRPr lang="es-PE" dirty="0"/>
           </a:p>

</xml_diff>